<commit_message>
adding first event library
</commit_message>
<xml_diff>
--- a/CLR_via_CSharp/Chapter 11 - Events/Events.pptx
+++ b/CLR_via_CSharp/Chapter 11 - Events/Events.pptx
@@ -10,6 +10,7 @@
     <p:sldId id="258" r:id="rId4"/>
     <p:sldId id="259" r:id="rId5"/>
     <p:sldId id="260" r:id="rId6"/>
+    <p:sldId id="261" r:id="rId7"/>
   </p:sldIdLst>
   <p:sldSz cx="12192000" cy="6858000"/>
   <p:notesSz cx="6858000" cy="9144000"/>
@@ -4514,6 +4515,89 @@
 </p:sld>
 </file>
 
+<file path=ppt/slides/slide6.xml><?xml version="1.0" encoding="utf-8"?>
+<p:sld xmlns:a="http://schemas.openxmlformats.org/drawingml/2006/main" xmlns:r="http://schemas.openxmlformats.org/officeDocument/2006/relationships" xmlns:p="http://schemas.openxmlformats.org/presentationml/2006/main">
+  <p:cSld>
+    <p:spTree>
+      <p:nvGrpSpPr>
+        <p:cNvPr id="1" name=""/>
+        <p:cNvGrpSpPr/>
+        <p:nvPr/>
+      </p:nvGrpSpPr>
+      <p:grpSpPr>
+        <a:xfrm>
+          <a:off x="0" y="0"/>
+          <a:ext cx="0" cy="0"/>
+          <a:chOff x="0" y="0"/>
+          <a:chExt cx="0" cy="0"/>
+        </a:xfrm>
+      </p:grpSpPr>
+      <p:sp>
+        <p:nvSpPr>
+          <p:cNvPr id="2" name="Title 1">
+            <a:extLst>
+              <a:ext uri="{FF2B5EF4-FFF2-40B4-BE49-F238E27FC236}">
+                <a16:creationId xmlns:a16="http://schemas.microsoft.com/office/drawing/2014/main" id="{E299635D-6B83-32F0-0F29-91EFBACC097D}"/>
+              </a:ext>
+            </a:extLst>
+          </p:cNvPr>
+          <p:cNvSpPr>
+            <a:spLocks noGrp="1"/>
+          </p:cNvSpPr>
+          <p:nvPr>
+            <p:ph type="title"/>
+          </p:nvPr>
+        </p:nvSpPr>
+        <p:spPr/>
+        <p:txBody>
+          <a:bodyPr/>
+          <a:lstStyle/>
+          <a:p>
+            <a:r>
+              <a:rPr lang="en-US" dirty="0"/>
+              <a:t>Let’s make it</a:t>
+            </a:r>
+          </a:p>
+        </p:txBody>
+      </p:sp>
+      <p:sp>
+        <p:nvSpPr>
+          <p:cNvPr id="3" name="Content Placeholder 2">
+            <a:extLst>
+              <a:ext uri="{FF2B5EF4-FFF2-40B4-BE49-F238E27FC236}">
+                <a16:creationId xmlns:a16="http://schemas.microsoft.com/office/drawing/2014/main" id="{84C3365C-8ECB-7151-41E2-2428E4B14307}"/>
+              </a:ext>
+            </a:extLst>
+          </p:cNvPr>
+          <p:cNvSpPr>
+            <a:spLocks noGrp="1"/>
+          </p:cNvSpPr>
+          <p:nvPr>
+            <p:ph idx="1"/>
+          </p:nvPr>
+        </p:nvSpPr>
+        <p:spPr/>
+        <p:txBody>
+          <a:bodyPr/>
+          <a:lstStyle/>
+          <a:p>
+            <a:endParaRPr lang="en-US"/>
+          </a:p>
+        </p:txBody>
+      </p:sp>
+    </p:spTree>
+    <p:extLst>
+      <p:ext uri="{BB962C8B-B14F-4D97-AF65-F5344CB8AC3E}">
+        <p14:creationId xmlns:p14="http://schemas.microsoft.com/office/powerpoint/2010/main" val="4203718008"/>
+      </p:ext>
+    </p:extLst>
+  </p:cSld>
+  <p:clrMapOvr>
+    <a:masterClrMapping/>
+  </p:clrMapOvr>
+</p:sld>
+</file>
+
 <file path=ppt/theme/theme1.xml><?xml version="1.0" encoding="utf-8"?>
 <a:theme xmlns:a="http://schemas.openxmlformats.org/drawingml/2006/main" name="Office Theme">
   <a:themeElements>

</xml_diff>

<commit_message>
updating with book example
</commit_message>
<xml_diff>
--- a/CLR_via_CSharp/Chapter 11 - Events/Events.pptx
+++ b/CLR_via_CSharp/Chapter 11 - Events/Events.pptx
@@ -10,7 +10,11 @@
     <p:sldId id="258" r:id="rId4"/>
     <p:sldId id="259" r:id="rId5"/>
     <p:sldId id="260" r:id="rId6"/>
-    <p:sldId id="261" r:id="rId7"/>
+    <p:sldId id="265" r:id="rId7"/>
+    <p:sldId id="261" r:id="rId8"/>
+    <p:sldId id="262" r:id="rId9"/>
+    <p:sldId id="263" r:id="rId10"/>
+    <p:sldId id="264" r:id="rId11"/>
   </p:sldIdLst>
   <p:sldSz cx="12192000" cy="6858000"/>
   <p:notesSz cx="6858000" cy="9144000"/>
@@ -110,6 +114,27 @@
     </a:lvl9pPr>
   </p:defaultTextStyle>
   <p:extLst>
+    <p:ext uri="{521415D9-36F7-43E2-AB2F-B90AF26B5E84}">
+      <p14:sectionLst xmlns:p14="http://schemas.microsoft.com/office/powerpoint/2010/main">
+        <p14:section name="Default Section" id="{E38AD332-BFBE-40EA-9B82-1519ECC9FA39}">
+          <p14:sldIdLst>
+            <p14:sldId id="256"/>
+            <p14:sldId id="257"/>
+            <p14:sldId id="258"/>
+            <p14:sldId id="259"/>
+            <p14:sldId id="260"/>
+            <p14:sldId id="265"/>
+            <p14:sldId id="261"/>
+            <p14:sldId id="262"/>
+            <p14:sldId id="263"/>
+            <p14:sldId id="264"/>
+          </p14:sldIdLst>
+        </p14:section>
+        <p14:section name="Untitled Section" id="{301A0426-181E-49F0-ACCF-4EEA7AECCD6C}">
+          <p14:sldIdLst/>
+        </p14:section>
+      </p14:sectionLst>
+    </p:ext>
     <p:ext uri="{EFAFB233-063F-42B5-8137-9DF3F51BA10A}">
       <p15:sldGuideLst xmlns:p15="http://schemas.microsoft.com/office/powerpoint/2012/main"/>
     </p:ext>
@@ -3047,6 +3072,89 @@
 </p:sld>
 </file>
 
+<file path=ppt/slides/slide10.xml><?xml version="1.0" encoding="utf-8"?>
+<p:sld xmlns:a="http://schemas.openxmlformats.org/drawingml/2006/main" xmlns:r="http://schemas.openxmlformats.org/officeDocument/2006/relationships" xmlns:p="http://schemas.openxmlformats.org/presentationml/2006/main">
+  <p:cSld>
+    <p:spTree>
+      <p:nvGrpSpPr>
+        <p:cNvPr id="1" name=""/>
+        <p:cNvGrpSpPr/>
+        <p:nvPr/>
+      </p:nvGrpSpPr>
+      <p:grpSpPr>
+        <a:xfrm>
+          <a:off x="0" y="0"/>
+          <a:ext cx="0" cy="0"/>
+          <a:chOff x="0" y="0"/>
+          <a:chExt cx="0" cy="0"/>
+        </a:xfrm>
+      </p:grpSpPr>
+      <p:sp>
+        <p:nvSpPr>
+          <p:cNvPr id="2" name="Title 1">
+            <a:extLst>
+              <a:ext uri="{FF2B5EF4-FFF2-40B4-BE49-F238E27FC236}">
+                <a16:creationId xmlns:a16="http://schemas.microsoft.com/office/drawing/2014/main" id="{74FBB2A6-AF56-647F-ECF7-329110E5945F}"/>
+              </a:ext>
+            </a:extLst>
+          </p:cNvPr>
+          <p:cNvSpPr>
+            <a:spLocks noGrp="1"/>
+          </p:cNvSpPr>
+          <p:nvPr>
+            <p:ph type="title"/>
+          </p:nvPr>
+        </p:nvSpPr>
+        <p:spPr/>
+        <p:txBody>
+          <a:bodyPr/>
+          <a:lstStyle/>
+          <a:p>
+            <a:r>
+              <a:rPr lang="en-US" dirty="0"/>
+              <a:t>Define a method to raise the event</a:t>
+            </a:r>
+          </a:p>
+        </p:txBody>
+      </p:sp>
+      <p:sp>
+        <p:nvSpPr>
+          <p:cNvPr id="3" name="Content Placeholder 2">
+            <a:extLst>
+              <a:ext uri="{FF2B5EF4-FFF2-40B4-BE49-F238E27FC236}">
+                <a16:creationId xmlns:a16="http://schemas.microsoft.com/office/drawing/2014/main" id="{986EA908-48BC-024F-6274-B727A35681C4}"/>
+              </a:ext>
+            </a:extLst>
+          </p:cNvPr>
+          <p:cNvSpPr>
+            <a:spLocks noGrp="1"/>
+          </p:cNvSpPr>
+          <p:nvPr>
+            <p:ph idx="1"/>
+          </p:nvPr>
+        </p:nvSpPr>
+        <p:spPr/>
+        <p:txBody>
+          <a:bodyPr/>
+          <a:lstStyle/>
+          <a:p>
+            <a:endParaRPr lang="en-US"/>
+          </a:p>
+        </p:txBody>
+      </p:sp>
+    </p:spTree>
+    <p:extLst>
+      <p:ext uri="{BB962C8B-B14F-4D97-AF65-F5344CB8AC3E}">
+        <p14:creationId xmlns:p14="http://schemas.microsoft.com/office/powerpoint/2010/main" val="1027937060"/>
+      </p:ext>
+    </p:extLst>
+  </p:cSld>
+  <p:clrMapOvr>
+    <a:masterClrMapping/>
+  </p:clrMapOvr>
+</p:sld>
+</file>
+
 <file path=ppt/slides/slide2.xml><?xml version="1.0" encoding="utf-8"?>
 <p:sld xmlns:a="http://schemas.openxmlformats.org/drawingml/2006/main" xmlns:r="http://schemas.openxmlformats.org/officeDocument/2006/relationships" xmlns:p="http://schemas.openxmlformats.org/presentationml/2006/main">
   <p:cSld>
@@ -4537,6 +4645,92 @@
           <p:cNvPr id="2" name="Title 1">
             <a:extLst>
               <a:ext uri="{FF2B5EF4-FFF2-40B4-BE49-F238E27FC236}">
+                <a16:creationId xmlns:a16="http://schemas.microsoft.com/office/drawing/2014/main" id="{D08DD0C8-E388-3D88-DDFF-7F2E76B4E393}"/>
+              </a:ext>
+            </a:extLst>
+          </p:cNvPr>
+          <p:cNvSpPr>
+            <a:spLocks noGrp="1"/>
+          </p:cNvSpPr>
+          <p:nvPr>
+            <p:ph type="title"/>
+          </p:nvPr>
+        </p:nvSpPr>
+        <p:spPr/>
+        <p:txBody>
+          <a:bodyPr/>
+          <a:lstStyle/>
+          <a:p>
+            <a:r>
+              <a:rPr lang="en-US" dirty="0"/>
+              <a:t>Observer Pattern</a:t>
+            </a:r>
+          </a:p>
+        </p:txBody>
+      </p:sp>
+      <p:sp>
+        <p:nvSpPr>
+          <p:cNvPr id="3" name="Content Placeholder 2">
+            <a:extLst>
+              <a:ext uri="{FF2B5EF4-FFF2-40B4-BE49-F238E27FC236}">
+                <a16:creationId xmlns:a16="http://schemas.microsoft.com/office/drawing/2014/main" id="{BBF60019-D7A8-C753-73D1-1C80277E200A}"/>
+              </a:ext>
+            </a:extLst>
+          </p:cNvPr>
+          <p:cNvSpPr>
+            <a:spLocks noGrp="1"/>
+          </p:cNvSpPr>
+          <p:nvPr>
+            <p:ph idx="1"/>
+          </p:nvPr>
+        </p:nvSpPr>
+        <p:spPr/>
+        <p:txBody>
+          <a:bodyPr/>
+          <a:lstStyle/>
+          <a:p>
+            <a:r>
+              <a:rPr lang="en-US" dirty="0"/>
+              <a:t>This is a direct implementation of the Observer pattern. Maybe Tate will say, “This guy Jeff covered it” and skip it</a:t>
+            </a:r>
+          </a:p>
+        </p:txBody>
+      </p:sp>
+    </p:spTree>
+    <p:extLst>
+      <p:ext uri="{BB962C8B-B14F-4D97-AF65-F5344CB8AC3E}">
+        <p14:creationId xmlns:p14="http://schemas.microsoft.com/office/powerpoint/2010/main" val="3209042868"/>
+      </p:ext>
+    </p:extLst>
+  </p:cSld>
+  <p:clrMapOvr>
+    <a:masterClrMapping/>
+  </p:clrMapOvr>
+</p:sld>
+</file>
+
+<file path=ppt/slides/slide7.xml><?xml version="1.0" encoding="utf-8"?>
+<p:sld xmlns:a="http://schemas.openxmlformats.org/drawingml/2006/main" xmlns:r="http://schemas.openxmlformats.org/officeDocument/2006/relationships" xmlns:p="http://schemas.openxmlformats.org/presentationml/2006/main">
+  <p:cSld>
+    <p:spTree>
+      <p:nvGrpSpPr>
+        <p:cNvPr id="1" name=""/>
+        <p:cNvGrpSpPr/>
+        <p:nvPr/>
+      </p:nvGrpSpPr>
+      <p:grpSpPr>
+        <a:xfrm>
+          <a:off x="0" y="0"/>
+          <a:ext cx="0" cy="0"/>
+          <a:chOff x="0" y="0"/>
+          <a:chExt cx="0" cy="0"/>
+        </a:xfrm>
+      </p:grpSpPr>
+      <p:sp>
+        <p:nvSpPr>
+          <p:cNvPr id="2" name="Title 1">
+            <a:extLst>
+              <a:ext uri="{FF2B5EF4-FFF2-40B4-BE49-F238E27FC236}">
                 <a16:creationId xmlns:a16="http://schemas.microsoft.com/office/drawing/2014/main" id="{E299635D-6B83-32F0-0F29-91EFBACC097D}"/>
               </a:ext>
             </a:extLst>
@@ -4555,7 +4749,7 @@
           <a:p>
             <a:r>
               <a:rPr lang="en-US" dirty="0"/>
-              <a:t>Let’s make it</a:t>
+              <a:t>What should our message contain?</a:t>
             </a:r>
           </a:p>
         </p:txBody>
@@ -4581,14 +4775,370 @@
           <a:bodyPr/>
           <a:lstStyle/>
           <a:p>
-            <a:endParaRPr lang="en-US"/>
-          </a:p>
-        </p:txBody>
-      </p:sp>
+            <a:pPr marL="514350" indent="-514350">
+              <a:buAutoNum type="arabicPeriod"/>
+            </a:pPr>
+            <a:r>
+              <a:rPr lang="en-US" dirty="0"/>
+              <a:t>Class contains ‘</a:t>
+            </a:r>
+            <a:r>
+              <a:rPr lang="en-US" dirty="0" err="1"/>
+              <a:t>EventArgs</a:t>
+            </a:r>
+            <a:r>
+              <a:rPr lang="en-US" dirty="0"/>
+              <a:t> at end’</a:t>
+            </a:r>
+          </a:p>
+          <a:p>
+            <a:pPr marL="514350" indent="-514350">
+              <a:buAutoNum type="arabicPeriod"/>
+            </a:pPr>
+            <a:r>
+              <a:rPr lang="en-US" dirty="0"/>
+              <a:t>Inherits Event </a:t>
+            </a:r>
+            <a:r>
+              <a:rPr lang="en-US" dirty="0" err="1"/>
+              <a:t>Args</a:t>
+            </a:r>
+            <a:r>
+              <a:rPr lang="en-US" dirty="0"/>
+              <a:t> </a:t>
+            </a:r>
+            <a:r>
+              <a:rPr lang="en-US" dirty="0">
+                <a:sym typeface="Wingdings" panose="05000000000000000000" pitchFamily="2" charset="2"/>
+              </a:rPr>
+              <a:t> wrapper class around Object</a:t>
+            </a:r>
+            <a:endParaRPr lang="en-US" dirty="0"/>
+          </a:p>
+        </p:txBody>
+      </p:sp>
+      <p:pic>
+        <p:nvPicPr>
+          <p:cNvPr id="5" name="Picture 4">
+            <a:extLst>
+              <a:ext uri="{FF2B5EF4-FFF2-40B4-BE49-F238E27FC236}">
+                <a16:creationId xmlns:a16="http://schemas.microsoft.com/office/drawing/2014/main" id="{C4724C74-0356-5FC6-2EE6-2606BB4580C8}"/>
+              </a:ext>
+            </a:extLst>
+          </p:cNvPr>
+          <p:cNvPicPr>
+            <a:picLocks noChangeAspect="1"/>
+          </p:cNvPicPr>
+          <p:nvPr/>
+        </p:nvPicPr>
+        <p:blipFill>
+          <a:blip r:embed="rId2"/>
+          <a:stretch>
+            <a:fillRect/>
+          </a:stretch>
+        </p:blipFill>
+        <p:spPr>
+          <a:xfrm>
+            <a:off x="2442531" y="3404980"/>
+            <a:ext cx="4103887" cy="2906920"/>
+          </a:xfrm>
+          <a:prstGeom prst="rect">
+            <a:avLst/>
+          </a:prstGeom>
+        </p:spPr>
+      </p:pic>
+      <p:pic>
+        <p:nvPicPr>
+          <p:cNvPr id="7" name="Picture 6">
+            <a:extLst>
+              <a:ext uri="{FF2B5EF4-FFF2-40B4-BE49-F238E27FC236}">
+                <a16:creationId xmlns:a16="http://schemas.microsoft.com/office/drawing/2014/main" id="{9DC91FE5-1B17-730A-C8E6-D66D66B3794D}"/>
+              </a:ext>
+            </a:extLst>
+          </p:cNvPr>
+          <p:cNvPicPr>
+            <a:picLocks noChangeAspect="1"/>
+          </p:cNvPicPr>
+          <p:nvPr/>
+        </p:nvPicPr>
+        <p:blipFill>
+          <a:blip r:embed="rId3"/>
+          <a:stretch>
+            <a:fillRect/>
+          </a:stretch>
+        </p:blipFill>
+        <p:spPr>
+          <a:xfrm>
+            <a:off x="7399282" y="3232903"/>
+            <a:ext cx="4194266" cy="3078997"/>
+          </a:xfrm>
+          <a:prstGeom prst="rect">
+            <a:avLst/>
+          </a:prstGeom>
+        </p:spPr>
+      </p:pic>
     </p:spTree>
     <p:extLst>
       <p:ext uri="{BB962C8B-B14F-4D97-AF65-F5344CB8AC3E}">
         <p14:creationId xmlns:p14="http://schemas.microsoft.com/office/powerpoint/2010/main" val="4203718008"/>
+      </p:ext>
+    </p:extLst>
+  </p:cSld>
+  <p:clrMapOvr>
+    <a:masterClrMapping/>
+  </p:clrMapOvr>
+</p:sld>
+</file>
+
+<file path=ppt/slides/slide8.xml><?xml version="1.0" encoding="utf-8"?>
+<p:sld xmlns:a="http://schemas.openxmlformats.org/drawingml/2006/main" xmlns:r="http://schemas.openxmlformats.org/officeDocument/2006/relationships" xmlns:p="http://schemas.openxmlformats.org/presentationml/2006/main">
+  <p:cSld>
+    <p:spTree>
+      <p:nvGrpSpPr>
+        <p:cNvPr id="1" name=""/>
+        <p:cNvGrpSpPr/>
+        <p:nvPr/>
+      </p:nvGrpSpPr>
+      <p:grpSpPr>
+        <a:xfrm>
+          <a:off x="0" y="0"/>
+          <a:ext cx="0" cy="0"/>
+          <a:chOff x="0" y="0"/>
+          <a:chExt cx="0" cy="0"/>
+        </a:xfrm>
+      </p:grpSpPr>
+      <p:sp>
+        <p:nvSpPr>
+          <p:cNvPr id="2" name="Title 1">
+            <a:extLst>
+              <a:ext uri="{FF2B5EF4-FFF2-40B4-BE49-F238E27FC236}">
+                <a16:creationId xmlns:a16="http://schemas.microsoft.com/office/drawing/2014/main" id="{719E9083-9C4C-8C8E-C694-27578539EB83}"/>
+              </a:ext>
+            </a:extLst>
+          </p:cNvPr>
+          <p:cNvSpPr>
+            <a:spLocks noGrp="1"/>
+          </p:cNvSpPr>
+          <p:nvPr>
+            <p:ph type="title"/>
+          </p:nvPr>
+        </p:nvSpPr>
+        <p:spPr/>
+        <p:txBody>
+          <a:bodyPr/>
+          <a:lstStyle/>
+          <a:p>
+            <a:r>
+              <a:rPr lang="en-US" dirty="0"/>
+              <a:t>Oh </a:t>
+            </a:r>
+            <a:r>
+              <a:rPr lang="en-US" dirty="0" err="1"/>
+              <a:t>Ildasm</a:t>
+            </a:r>
+            <a:endParaRPr lang="en-US" dirty="0"/>
+          </a:p>
+        </p:txBody>
+      </p:sp>
+      <p:pic>
+        <p:nvPicPr>
+          <p:cNvPr id="4" name="Picture 3">
+            <a:extLst>
+              <a:ext uri="{FF2B5EF4-FFF2-40B4-BE49-F238E27FC236}">
+                <a16:creationId xmlns:a16="http://schemas.microsoft.com/office/drawing/2014/main" id="{1D417E0B-B4C2-D731-E44E-E66227E4A9C1}"/>
+              </a:ext>
+            </a:extLst>
+          </p:cNvPr>
+          <p:cNvPicPr>
+            <a:picLocks noChangeAspect="1"/>
+          </p:cNvPicPr>
+          <p:nvPr/>
+        </p:nvPicPr>
+        <p:blipFill>
+          <a:blip r:embed="rId2"/>
+          <a:stretch>
+            <a:fillRect/>
+          </a:stretch>
+        </p:blipFill>
+        <p:spPr>
+          <a:xfrm>
+            <a:off x="1635707" y="2764004"/>
+            <a:ext cx="4103887" cy="2906920"/>
+          </a:xfrm>
+          <a:prstGeom prst="rect">
+            <a:avLst/>
+          </a:prstGeom>
+        </p:spPr>
+      </p:pic>
+      <p:pic>
+        <p:nvPicPr>
+          <p:cNvPr id="5" name="Picture 4">
+            <a:extLst>
+              <a:ext uri="{FF2B5EF4-FFF2-40B4-BE49-F238E27FC236}">
+                <a16:creationId xmlns:a16="http://schemas.microsoft.com/office/drawing/2014/main" id="{AD36CB45-0256-79EA-D0E6-93944259493C}"/>
+              </a:ext>
+            </a:extLst>
+          </p:cNvPr>
+          <p:cNvPicPr>
+            <a:picLocks noChangeAspect="1"/>
+          </p:cNvPicPr>
+          <p:nvPr/>
+        </p:nvPicPr>
+        <p:blipFill>
+          <a:blip r:embed="rId3"/>
+          <a:stretch>
+            <a:fillRect/>
+          </a:stretch>
+        </p:blipFill>
+        <p:spPr>
+          <a:xfrm>
+            <a:off x="6592458" y="2591927"/>
+            <a:ext cx="4194266" cy="3078997"/>
+          </a:xfrm>
+          <a:prstGeom prst="rect">
+            <a:avLst/>
+          </a:prstGeom>
+        </p:spPr>
+      </p:pic>
+    </p:spTree>
+    <p:extLst>
+      <p:ext uri="{BB962C8B-B14F-4D97-AF65-F5344CB8AC3E}">
+        <p14:creationId xmlns:p14="http://schemas.microsoft.com/office/powerpoint/2010/main" val="907062497"/>
+      </p:ext>
+    </p:extLst>
+  </p:cSld>
+  <p:clrMapOvr>
+    <a:masterClrMapping/>
+  </p:clrMapOvr>
+</p:sld>
+</file>
+
+<file path=ppt/slides/slide9.xml><?xml version="1.0" encoding="utf-8"?>
+<p:sld xmlns:a="http://schemas.openxmlformats.org/drawingml/2006/main" xmlns:r="http://schemas.openxmlformats.org/officeDocument/2006/relationships" xmlns:p="http://schemas.openxmlformats.org/presentationml/2006/main">
+  <p:cSld>
+    <p:spTree>
+      <p:nvGrpSpPr>
+        <p:cNvPr id="1" name=""/>
+        <p:cNvGrpSpPr/>
+        <p:nvPr/>
+      </p:nvGrpSpPr>
+      <p:grpSpPr>
+        <a:xfrm>
+          <a:off x="0" y="0"/>
+          <a:ext cx="0" cy="0"/>
+          <a:chOff x="0" y="0"/>
+          <a:chExt cx="0" cy="0"/>
+        </a:xfrm>
+      </p:grpSpPr>
+      <p:sp>
+        <p:nvSpPr>
+          <p:cNvPr id="2" name="Title 1">
+            <a:extLst>
+              <a:ext uri="{FF2B5EF4-FFF2-40B4-BE49-F238E27FC236}">
+                <a16:creationId xmlns:a16="http://schemas.microsoft.com/office/drawing/2014/main" id="{6CC4E411-9B4A-D687-AB8C-D549324F5734}"/>
+              </a:ext>
+            </a:extLst>
+          </p:cNvPr>
+          <p:cNvSpPr>
+            <a:spLocks noGrp="1"/>
+          </p:cNvSpPr>
+          <p:nvPr>
+            <p:ph type="title"/>
+          </p:nvPr>
+        </p:nvSpPr>
+        <p:spPr/>
+        <p:txBody>
+          <a:bodyPr/>
+          <a:lstStyle/>
+          <a:p>
+            <a:r>
+              <a:rPr lang="en-US" dirty="0"/>
+              <a:t>It’s called event’s </a:t>
+            </a:r>
+            <a:r>
+              <a:rPr lang="en-US" dirty="0" err="1"/>
+              <a:t>aint</a:t>
+            </a:r>
+            <a:r>
+              <a:rPr lang="en-US" dirty="0"/>
+              <a:t> it</a:t>
+            </a:r>
+          </a:p>
+        </p:txBody>
+      </p:sp>
+      <p:sp>
+        <p:nvSpPr>
+          <p:cNvPr id="3" name="Content Placeholder 2">
+            <a:extLst>
+              <a:ext uri="{FF2B5EF4-FFF2-40B4-BE49-F238E27FC236}">
+                <a16:creationId xmlns:a16="http://schemas.microsoft.com/office/drawing/2014/main" id="{FEBB577B-D02B-3B6B-BB4B-7ED2E221745F}"/>
+              </a:ext>
+            </a:extLst>
+          </p:cNvPr>
+          <p:cNvSpPr>
+            <a:spLocks noGrp="1"/>
+          </p:cNvSpPr>
+          <p:nvPr>
+            <p:ph idx="1"/>
+          </p:nvPr>
+        </p:nvSpPr>
+        <p:spPr/>
+        <p:txBody>
+          <a:bodyPr/>
+          <a:lstStyle/>
+          <a:p>
+            <a:r>
+              <a:rPr lang="en-US" dirty="0"/>
+              <a:t>Create a class that’s got an </a:t>
+            </a:r>
+            <a:r>
+              <a:rPr lang="en-US" dirty="0" err="1"/>
+              <a:t>envent</a:t>
+            </a:r>
+            <a:endParaRPr lang="en-US" dirty="0"/>
+          </a:p>
+          <a:p>
+            <a:r>
+              <a:rPr lang="en-US" dirty="0"/>
+              <a:t>What should the visibility of that member be?</a:t>
+            </a:r>
+          </a:p>
+        </p:txBody>
+      </p:sp>
+      <p:pic>
+        <p:nvPicPr>
+          <p:cNvPr id="5" name="Picture 4">
+            <a:extLst>
+              <a:ext uri="{FF2B5EF4-FFF2-40B4-BE49-F238E27FC236}">
+                <a16:creationId xmlns:a16="http://schemas.microsoft.com/office/drawing/2014/main" id="{14AF3856-B1C6-D4F5-9606-A9335C37E04E}"/>
+              </a:ext>
+            </a:extLst>
+          </p:cNvPr>
+          <p:cNvPicPr>
+            <a:picLocks noChangeAspect="1"/>
+          </p:cNvPicPr>
+          <p:nvPr/>
+        </p:nvPicPr>
+        <p:blipFill>
+          <a:blip r:embed="rId2"/>
+          <a:stretch>
+            <a:fillRect/>
+          </a:stretch>
+        </p:blipFill>
+        <p:spPr>
+          <a:xfrm>
+            <a:off x="1271956" y="3370444"/>
+            <a:ext cx="5982535" cy="2343477"/>
+          </a:xfrm>
+          <a:prstGeom prst="rect">
+            <a:avLst/>
+          </a:prstGeom>
+        </p:spPr>
+      </p:pic>
+    </p:spTree>
+    <p:extLst>
+      <p:ext uri="{BB962C8B-B14F-4D97-AF65-F5344CB8AC3E}">
+        <p14:creationId xmlns:p14="http://schemas.microsoft.com/office/powerpoint/2010/main" val="1675674996"/>
       </p:ext>
     </p:extLst>
   </p:cSld>

</xml_diff>